<commit_message>
Updated OKC SQL PowerPoint
</commit_message>
<xml_diff>
--- a/2018-01-15 OKC SQL.pptx
+++ b/2018-01-15 OKC SQL.pptx
@@ -2192,11 +2192,11 @@
   <p:clrMapOvr>
     <a:masterClrMapping/>
   </p:clrMapOvr>
-  <mc:AlternateContent xmlns:mc="http://schemas.openxmlformats.org/markup-compatibility/2006">
-    <mc:Choice xmlns:p14="http://schemas.microsoft.com/office/powerpoint/2010/main" Requires="p14">
+  <mc:AlternateContent xmlns:mc="http://schemas.openxmlformats.org/markup-compatibility/2006" xmlns:p14="http://schemas.microsoft.com/office/powerpoint/2010/main">
+    <mc:Choice Requires="p14">
       <p:transition spd="slow" p14:dur="2000" advTm="10000"/>
     </mc:Choice>
-    <mc:Fallback>
+    <mc:Fallback xmlns="">
       <p:transition spd="slow" advTm="10000"/>
     </mc:Fallback>
   </mc:AlternateContent>
@@ -2686,11 +2686,11 @@
   <p:clrMapOvr>
     <a:masterClrMapping/>
   </p:clrMapOvr>
-  <mc:AlternateContent xmlns:mc="http://schemas.openxmlformats.org/markup-compatibility/2006">
-    <mc:Choice xmlns:p14="http://schemas.microsoft.com/office/powerpoint/2010/main" Requires="p14">
+  <mc:AlternateContent xmlns:mc="http://schemas.openxmlformats.org/markup-compatibility/2006" xmlns:p14="http://schemas.microsoft.com/office/powerpoint/2010/main">
+    <mc:Choice Requires="p14">
       <p:transition spd="slow" p14:dur="2000" advTm="10000"/>
     </mc:Choice>
-    <mc:Fallback>
+    <mc:Fallback xmlns="">
       <p:transition spd="slow" advTm="10000"/>
     </mc:Fallback>
   </mc:AlternateContent>
@@ -2761,11 +2761,11 @@
   <p:clrMapOvr>
     <a:masterClrMapping/>
   </p:clrMapOvr>
-  <mc:AlternateContent xmlns:mc="http://schemas.openxmlformats.org/markup-compatibility/2006">
-    <mc:Choice xmlns:p14="http://schemas.microsoft.com/office/powerpoint/2010/main" Requires="p14">
+  <mc:AlternateContent xmlns:mc="http://schemas.openxmlformats.org/markup-compatibility/2006" xmlns:p14="http://schemas.microsoft.com/office/powerpoint/2010/main">
+    <mc:Choice Requires="p14">
       <p:transition spd="slow" p14:dur="2000" advTm="10000"/>
     </mc:Choice>
-    <mc:Fallback>
+    <mc:Fallback xmlns="">
       <p:transition spd="slow" advTm="10000"/>
     </mc:Fallback>
   </mc:AlternateContent>
@@ -3011,11 +3011,11 @@
   <p:clrMapOvr>
     <a:masterClrMapping/>
   </p:clrMapOvr>
-  <mc:AlternateContent xmlns:mc="http://schemas.openxmlformats.org/markup-compatibility/2006">
-    <mc:Choice xmlns:p14="http://schemas.microsoft.com/office/powerpoint/2010/main" Requires="p14">
+  <mc:AlternateContent xmlns:mc="http://schemas.openxmlformats.org/markup-compatibility/2006" xmlns:p14="http://schemas.microsoft.com/office/powerpoint/2010/main">
+    <mc:Choice Requires="p14">
       <p:transition spd="slow" p14:dur="2000" advTm="10000"/>
     </mc:Choice>
-    <mc:Fallback>
+    <mc:Fallback xmlns="">
       <p:transition spd="slow" advTm="10000"/>
     </mc:Fallback>
   </mc:AlternateContent>
@@ -3340,11 +3340,11 @@
   <p:clrMapOvr>
     <a:masterClrMapping/>
   </p:clrMapOvr>
-  <mc:AlternateContent xmlns:mc="http://schemas.openxmlformats.org/markup-compatibility/2006">
-    <mc:Choice xmlns:p14="http://schemas.microsoft.com/office/powerpoint/2010/main" Requires="p14">
+  <mc:AlternateContent xmlns:mc="http://schemas.openxmlformats.org/markup-compatibility/2006" xmlns:p14="http://schemas.microsoft.com/office/powerpoint/2010/main">
+    <mc:Choice Requires="p14">
       <p:transition spd="slow" p14:dur="2000" advTm="10000"/>
     </mc:Choice>
-    <mc:Fallback>
+    <mc:Fallback xmlns="">
       <p:transition spd="slow" advTm="10000"/>
     </mc:Fallback>
   </mc:AlternateContent>
@@ -3796,11 +3796,11 @@
   <p:clrMapOvr>
     <a:masterClrMapping/>
   </p:clrMapOvr>
-  <mc:AlternateContent xmlns:mc="http://schemas.openxmlformats.org/markup-compatibility/2006">
-    <mc:Choice xmlns:p14="http://schemas.microsoft.com/office/powerpoint/2010/main" Requires="p14">
+  <mc:AlternateContent xmlns:mc="http://schemas.openxmlformats.org/markup-compatibility/2006" xmlns:p14="http://schemas.microsoft.com/office/powerpoint/2010/main">
+    <mc:Choice Requires="p14">
       <p:transition spd="slow" p14:dur="2000" advTm="10000"/>
     </mc:Choice>
-    <mc:Fallback>
+    <mc:Fallback xmlns="">
       <p:transition spd="slow" advTm="10000"/>
     </mc:Fallback>
   </mc:AlternateContent>
@@ -3998,11 +3998,11 @@
   <p:clrMapOvr>
     <a:masterClrMapping/>
   </p:clrMapOvr>
-  <mc:AlternateContent xmlns:mc="http://schemas.openxmlformats.org/markup-compatibility/2006">
-    <mc:Choice xmlns:p14="http://schemas.microsoft.com/office/powerpoint/2010/main" Requires="p14">
+  <mc:AlternateContent xmlns:mc="http://schemas.openxmlformats.org/markup-compatibility/2006" xmlns:p14="http://schemas.microsoft.com/office/powerpoint/2010/main">
+    <mc:Choice Requires="p14">
       <p:transition spd="slow" p14:dur="2000" advTm="10000"/>
     </mc:Choice>
-    <mc:Fallback>
+    <mc:Fallback xmlns="">
       <p:transition spd="slow" advTm="10000"/>
     </mc:Fallback>
   </mc:AlternateContent>
@@ -4327,11 +4327,11 @@
   <p:clrMapOvr>
     <a:masterClrMapping/>
   </p:clrMapOvr>
-  <mc:AlternateContent xmlns:mc="http://schemas.openxmlformats.org/markup-compatibility/2006">
-    <mc:Choice xmlns:p14="http://schemas.microsoft.com/office/powerpoint/2010/main" Requires="p14">
+  <mc:AlternateContent xmlns:mc="http://schemas.openxmlformats.org/markup-compatibility/2006" xmlns:p14="http://schemas.microsoft.com/office/powerpoint/2010/main">
+    <mc:Choice Requires="p14">
       <p:transition spd="slow" p14:dur="2000" advTm="10000"/>
     </mc:Choice>
-    <mc:Fallback>
+    <mc:Fallback xmlns="">
       <p:transition spd="slow" advTm="10000"/>
     </mc:Fallback>
   </mc:AlternateContent>
@@ -4608,11 +4608,11 @@
   <p:clrMapOvr>
     <a:masterClrMapping/>
   </p:clrMapOvr>
-  <mc:AlternateContent xmlns:mc="http://schemas.openxmlformats.org/markup-compatibility/2006">
-    <mc:Choice xmlns:p14="http://schemas.microsoft.com/office/powerpoint/2010/main" Requires="p14">
+  <mc:AlternateContent xmlns:mc="http://schemas.openxmlformats.org/markup-compatibility/2006" xmlns:p14="http://schemas.microsoft.com/office/powerpoint/2010/main">
+    <mc:Choice Requires="p14">
       <p:transition spd="slow" p14:dur="2000" advTm="10000"/>
     </mc:Choice>
-    <mc:Fallback>
+    <mc:Fallback xmlns="">
       <p:transition spd="slow" advTm="10000"/>
     </mc:Fallback>
   </mc:AlternateContent>
@@ -5228,11 +5228,11 @@
   <p:clrMapOvr>
     <a:masterClrMapping/>
   </p:clrMapOvr>
-  <mc:AlternateContent xmlns:mc="http://schemas.openxmlformats.org/markup-compatibility/2006">
-    <mc:Choice xmlns:p14="http://schemas.microsoft.com/office/powerpoint/2010/main" Requires="p14">
+  <mc:AlternateContent xmlns:mc="http://schemas.openxmlformats.org/markup-compatibility/2006" xmlns:p14="http://schemas.microsoft.com/office/powerpoint/2010/main">
+    <mc:Choice Requires="p14">
       <p:transition spd="slow" p14:dur="2000" advTm="10000"/>
     </mc:Choice>
-    <mc:Fallback>
+    <mc:Fallback xmlns="">
       <p:transition spd="slow" advTm="10000"/>
     </mc:Fallback>
   </mc:AlternateContent>
@@ -5345,11 +5345,11 @@
   <p:clrMapOvr>
     <a:masterClrMapping/>
   </p:clrMapOvr>
-  <mc:AlternateContent xmlns:mc="http://schemas.openxmlformats.org/markup-compatibility/2006">
-    <mc:Choice xmlns:p14="http://schemas.microsoft.com/office/powerpoint/2010/main" Requires="p14">
+  <mc:AlternateContent xmlns:mc="http://schemas.openxmlformats.org/markup-compatibility/2006" xmlns:p14="http://schemas.microsoft.com/office/powerpoint/2010/main">
+    <mc:Choice Requires="p14">
       <p:transition spd="slow" p14:dur="2000" advTm="10000"/>
     </mc:Choice>
-    <mc:Fallback>
+    <mc:Fallback xmlns="">
       <p:transition spd="slow" advTm="10000"/>
     </mc:Fallback>
   </mc:AlternateContent>
@@ -5964,11 +5964,11 @@
     <p:sldLayoutId id="2147483657" r:id="rId10"/>
     <p:sldLayoutId id="2147483658" r:id="rId11"/>
   </p:sldLayoutIdLst>
-  <mc:AlternateContent xmlns:mc="http://schemas.openxmlformats.org/markup-compatibility/2006">
-    <mc:Choice xmlns:p14="http://schemas.microsoft.com/office/powerpoint/2010/main" Requires="p14">
+  <mc:AlternateContent xmlns:mc="http://schemas.openxmlformats.org/markup-compatibility/2006" xmlns:p14="http://schemas.microsoft.com/office/powerpoint/2010/main">
+    <mc:Choice Requires="p14">
       <p:transition spd="slow" p14:dur="2000" advTm="10000"/>
     </mc:Choice>
-    <mc:Fallback>
+    <mc:Fallback xmlns="">
       <p:transition spd="slow" advTm="10000"/>
     </mc:Fallback>
   </mc:AlternateContent>
@@ -6540,11 +6540,11 @@
   <p:clrMapOvr>
     <a:masterClrMapping/>
   </p:clrMapOvr>
-  <mc:AlternateContent xmlns:mc="http://schemas.openxmlformats.org/markup-compatibility/2006">
-    <mc:Choice xmlns:p14="http://schemas.microsoft.com/office/powerpoint/2010/main" Requires="p14">
+  <mc:AlternateContent xmlns:mc="http://schemas.openxmlformats.org/markup-compatibility/2006" xmlns:p14="http://schemas.microsoft.com/office/powerpoint/2010/main">
+    <mc:Choice Requires="p14">
       <p:transition spd="slow" p14:dur="2000" advTm="10000"/>
     </mc:Choice>
-    <mc:Fallback>
+    <mc:Fallback xmlns="">
       <p:transition spd="slow" advTm="10000"/>
     </mc:Fallback>
   </mc:AlternateContent>
@@ -6724,11 +6724,11 @@
   <p:clrMapOvr>
     <a:masterClrMapping/>
   </p:clrMapOvr>
-  <mc:AlternateContent xmlns:mc="http://schemas.openxmlformats.org/markup-compatibility/2006">
-    <mc:Choice xmlns:p14="http://schemas.microsoft.com/office/powerpoint/2010/main" Requires="p14">
+  <mc:AlternateContent xmlns:mc="http://schemas.openxmlformats.org/markup-compatibility/2006" xmlns:p14="http://schemas.microsoft.com/office/powerpoint/2010/main">
+    <mc:Choice Requires="p14">
       <p:transition spd="slow" p14:dur="2000" advTm="10000"/>
     </mc:Choice>
-    <mc:Fallback>
+    <mc:Fallback xmlns="">
       <p:transition spd="slow" advTm="10000"/>
     </mc:Fallback>
   </mc:AlternateContent>
@@ -6908,11 +6908,11 @@
   <p:clrMapOvr>
     <a:masterClrMapping/>
   </p:clrMapOvr>
-  <mc:AlternateContent xmlns:mc="http://schemas.openxmlformats.org/markup-compatibility/2006">
-    <mc:Choice xmlns:p14="http://schemas.microsoft.com/office/powerpoint/2010/main" Requires="p14">
+  <mc:AlternateContent xmlns:mc="http://schemas.openxmlformats.org/markup-compatibility/2006" xmlns:p14="http://schemas.microsoft.com/office/powerpoint/2010/main">
+    <mc:Choice Requires="p14">
       <p:transition spd="slow" p14:dur="2000" advTm="10000"/>
     </mc:Choice>
-    <mc:Fallback>
+    <mc:Fallback xmlns="">
       <p:transition spd="slow" advTm="10000"/>
     </mc:Fallback>
   </mc:AlternateContent>
@@ -7092,11 +7092,11 @@
   <p:clrMapOvr>
     <a:masterClrMapping/>
   </p:clrMapOvr>
-  <mc:AlternateContent xmlns:mc="http://schemas.openxmlformats.org/markup-compatibility/2006">
-    <mc:Choice xmlns:p14="http://schemas.microsoft.com/office/powerpoint/2010/main" Requires="p14">
+  <mc:AlternateContent xmlns:mc="http://schemas.openxmlformats.org/markup-compatibility/2006" xmlns:p14="http://schemas.microsoft.com/office/powerpoint/2010/main">
+    <mc:Choice Requires="p14">
       <p:transition spd="slow" p14:dur="2000" advTm="10000"/>
     </mc:Choice>
-    <mc:Fallback>
+    <mc:Fallback xmlns="">
       <p:transition spd="slow" advTm="10000"/>
     </mc:Fallback>
   </mc:AlternateContent>
@@ -7183,11 +7183,11 @@
   <p:clrMapOvr>
     <a:masterClrMapping/>
   </p:clrMapOvr>
-  <mc:AlternateContent xmlns:mc="http://schemas.openxmlformats.org/markup-compatibility/2006">
-    <mc:Choice xmlns:p14="http://schemas.microsoft.com/office/powerpoint/2010/main" Requires="p14">
+  <mc:AlternateContent xmlns:mc="http://schemas.openxmlformats.org/markup-compatibility/2006" xmlns:p14="http://schemas.microsoft.com/office/powerpoint/2010/main">
+    <mc:Choice Requires="p14">
       <p:transition spd="slow" p14:dur="2000" advTm="10000"/>
     </mc:Choice>
-    <mc:Fallback>
+    <mc:Fallback xmlns="">
       <p:transition spd="slow" advTm="10000"/>
     </mc:Fallback>
   </mc:AlternateContent>
@@ -7364,11 +7364,11 @@
   <p:clrMapOvr>
     <a:masterClrMapping/>
   </p:clrMapOvr>
-  <mc:AlternateContent xmlns:mc="http://schemas.openxmlformats.org/markup-compatibility/2006">
-    <mc:Choice xmlns:p14="http://schemas.microsoft.com/office/powerpoint/2010/main" Requires="p14">
+  <mc:AlternateContent xmlns:mc="http://schemas.openxmlformats.org/markup-compatibility/2006" xmlns:p14="http://schemas.microsoft.com/office/powerpoint/2010/main">
+    <mc:Choice Requires="p14">
       <p:transition spd="slow" p14:dur="2000" advTm="10000"/>
     </mc:Choice>
-    <mc:Fallback>
+    <mc:Fallback xmlns="">
       <p:transition spd="slow" advTm="10000"/>
     </mc:Fallback>
   </mc:AlternateContent>
@@ -7540,11 +7540,11 @@
   <p:clrMapOvr>
     <a:masterClrMapping/>
   </p:clrMapOvr>
-  <mc:AlternateContent xmlns:mc="http://schemas.openxmlformats.org/markup-compatibility/2006">
-    <mc:Choice xmlns:p14="http://schemas.microsoft.com/office/powerpoint/2010/main" Requires="p14">
+  <mc:AlternateContent xmlns:mc="http://schemas.openxmlformats.org/markup-compatibility/2006" xmlns:p14="http://schemas.microsoft.com/office/powerpoint/2010/main">
+    <mc:Choice Requires="p14">
       <p:transition spd="slow" p14:dur="2000" advTm="10000"/>
     </mc:Choice>
-    <mc:Fallback>
+    <mc:Fallback xmlns="">
       <p:transition spd="slow" advTm="10000"/>
     </mc:Fallback>
   </mc:AlternateContent>
@@ -7705,11 +7705,11 @@
   <p:clrMapOvr>
     <a:masterClrMapping/>
   </p:clrMapOvr>
-  <mc:AlternateContent xmlns:mc="http://schemas.openxmlformats.org/markup-compatibility/2006">
-    <mc:Choice xmlns:p14="http://schemas.microsoft.com/office/powerpoint/2010/main" Requires="p14">
+  <mc:AlternateContent xmlns:mc="http://schemas.openxmlformats.org/markup-compatibility/2006" xmlns:p14="http://schemas.microsoft.com/office/powerpoint/2010/main">
+    <mc:Choice Requires="p14">
       <p:transition spd="slow" p14:dur="2000" advTm="10000"/>
     </mc:Choice>
-    <mc:Fallback>
+    <mc:Fallback xmlns="">
       <p:transition spd="slow" advTm="10000"/>
     </mc:Fallback>
   </mc:AlternateContent>
@@ -7810,7 +7810,7 @@
               <a:buNone/>
             </a:pPr>
             <a:r>
-              <a:rPr lang="en" u="sng">
+              <a:rPr lang="en" u="sng" dirty="0">
                 <a:solidFill>
                   <a:schemeClr val="hlink"/>
                 </a:solidFill>
@@ -7819,10 +7819,10 @@
               <a:t>starspace46.com/calendar-1</a:t>
             </a:r>
             <a:r>
-              <a:rPr lang="en"/>
+              <a:rPr lang="en" dirty="0"/>
               <a:t> </a:t>
             </a:r>
-            <a:endParaRPr/>
+            <a:endParaRPr dirty="0"/>
           </a:p>
           <a:p>
             <a:pPr marL="0" lvl="0" indent="0">
@@ -7835,7 +7835,7 @@
               <a:buNone/>
             </a:pPr>
             <a:r>
-              <a:rPr lang="en" u="sng">
+              <a:rPr lang="en" u="sng" dirty="0">
                 <a:solidFill>
                   <a:schemeClr val="hlink"/>
                 </a:solidFill>
@@ -7844,10 +7844,10 @@
               <a:t>twitter.com/StarSpace46</a:t>
             </a:r>
             <a:r>
-              <a:rPr lang="en"/>
+              <a:rPr lang="en" dirty="0"/>
               <a:t> </a:t>
             </a:r>
-            <a:endParaRPr/>
+            <a:endParaRPr dirty="0"/>
           </a:p>
           <a:p>
             <a:pPr marL="0" lvl="0" indent="0" rtl="0">
@@ -7860,10 +7860,10 @@
               <a:buNone/>
             </a:pPr>
             <a:r>
-              <a:rPr lang="en"/>
+              <a:rPr lang="en" dirty="0"/>
               <a:t>Community membership $40/month</a:t>
             </a:r>
-            <a:endParaRPr/>
+            <a:endParaRPr dirty="0"/>
           </a:p>
         </p:txBody>
       </p:sp>
@@ -7872,11 +7872,11 @@
   <p:clrMapOvr>
     <a:masterClrMapping/>
   </p:clrMapOvr>
-  <mc:AlternateContent xmlns:mc="http://schemas.openxmlformats.org/markup-compatibility/2006">
-    <mc:Choice xmlns:p14="http://schemas.microsoft.com/office/powerpoint/2010/main" Requires="p14">
+  <mc:AlternateContent xmlns:mc="http://schemas.openxmlformats.org/markup-compatibility/2006" xmlns:p14="http://schemas.microsoft.com/office/powerpoint/2010/main">
+    <mc:Choice Requires="p14">
       <p:transition spd="slow" p14:dur="2000" advTm="10000"/>
     </mc:Choice>
-    <mc:Fallback>
+    <mc:Fallback xmlns="">
       <p:transition spd="slow" advTm="10000"/>
     </mc:Fallback>
   </mc:AlternateContent>
@@ -7935,10 +7935,10 @@
               <a:buNone/>
             </a:pPr>
             <a:r>
-              <a:rPr lang="en"/>
+              <a:rPr lang="en" sz="5400" dirty="0"/>
               <a:t>Twitch.tv/Techlahoma</a:t>
             </a:r>
-            <a:endParaRPr/>
+            <a:endParaRPr sz="5400" dirty="0"/>
           </a:p>
         </p:txBody>
       </p:sp>
@@ -8021,11 +8021,11 @@
   <p:clrMapOvr>
     <a:masterClrMapping/>
   </p:clrMapOvr>
-  <mc:AlternateContent xmlns:mc="http://schemas.openxmlformats.org/markup-compatibility/2006">
-    <mc:Choice xmlns:p14="http://schemas.microsoft.com/office/powerpoint/2010/main" Requires="p14">
+  <mc:AlternateContent xmlns:mc="http://schemas.openxmlformats.org/markup-compatibility/2006" xmlns:p14="http://schemas.microsoft.com/office/powerpoint/2010/main">
+    <mc:Choice Requires="p14">
       <p:transition spd="slow" p14:dur="2000" advTm="10000"/>
     </mc:Choice>
-    <mc:Fallback>
+    <mc:Fallback xmlns="">
       <p:transition spd="slow" advTm="10000"/>
     </mc:Fallback>
   </mc:AlternateContent>
@@ -8163,11 +8163,11 @@
   <p:clrMapOvr>
     <a:masterClrMapping/>
   </p:clrMapOvr>
-  <mc:AlternateContent xmlns:mc="http://schemas.openxmlformats.org/markup-compatibility/2006">
-    <mc:Choice xmlns:p14="http://schemas.microsoft.com/office/powerpoint/2010/main" Requires="p14">
+  <mc:AlternateContent xmlns:mc="http://schemas.openxmlformats.org/markup-compatibility/2006" xmlns:p14="http://schemas.microsoft.com/office/powerpoint/2010/main">
+    <mc:Choice Requires="p14">
       <p:transition spd="slow" p14:dur="2000" advTm="10000"/>
     </mc:Choice>
-    <mc:Fallback>
+    <mc:Fallback xmlns="">
       <p:transition spd="slow" advTm="10000"/>
     </mc:Fallback>
   </mc:AlternateContent>
@@ -8347,11 +8347,11 @@
   <p:clrMapOvr>
     <a:masterClrMapping/>
   </p:clrMapOvr>
-  <mc:AlternateContent xmlns:mc="http://schemas.openxmlformats.org/markup-compatibility/2006">
-    <mc:Choice xmlns:p14="http://schemas.microsoft.com/office/powerpoint/2010/main" Requires="p14">
+  <mc:AlternateContent xmlns:mc="http://schemas.openxmlformats.org/markup-compatibility/2006" xmlns:p14="http://schemas.microsoft.com/office/powerpoint/2010/main">
+    <mc:Choice Requires="p14">
       <p:transition spd="slow" p14:dur="2000" advTm="10000"/>
     </mc:Choice>
-    <mc:Fallback>
+    <mc:Fallback xmlns="">
       <p:transition spd="slow" advTm="10000"/>
     </mc:Fallback>
   </mc:AlternateContent>

</xml_diff>